<commit_message>
Updated time slot per presenter
</commit_message>
<xml_diff>
--- a/lectures/introduction-internship.pptx
+++ b/lectures/introduction-internship.pptx
@@ -381,7 +381,7 @@
             <a:fld id="{8AD1700A-0812-4960-BDAF-BBEBDA6F415D}" type="datetime1">
               <a:rPr lang="en-US" altLang="en-US"/>
               <a:pPr/>
-              <a:t>1/12/24</a:t>
+              <a:t>8/19/2024</a:t>
             </a:fld>
             <a:endParaRPr lang="en-US" altLang="en-US"/>
           </a:p>
@@ -663,7 +663,7 @@
           </a:ln>
           <a:extLst>
             <a:ext uri="{909E8E84-426E-40dd-AFC4-6F175D3DCCD1}">
-              <a14:hiddenFill xmlns="" xmlns:a14="http://schemas.microsoft.com/office/drawing/2010/main">
+              <a14:hiddenFill xmlns:a14="http://schemas.microsoft.com/office/drawing/2010/main" xmlns="">
                 <a:solidFill>
                   <a:srgbClr val="FFFFFF"/>
                 </a:solidFill>
@@ -1048,14 +1048,14 @@
           <a:ln/>
           <a:extLst>
             <a:ext uri="{909E8E84-426E-40dd-AFC4-6F175D3DCCD1}">
-              <a14:hiddenFill xmlns="" xmlns:a14="http://schemas.microsoft.com/office/drawing/2010/main">
+              <a14:hiddenFill xmlns:a14="http://schemas.microsoft.com/office/drawing/2010/main" xmlns="">
                 <a:solidFill>
                   <a:srgbClr val="FFFFFF"/>
                 </a:solidFill>
               </a14:hiddenFill>
             </a:ext>
             <a:ext uri="{91240B29-F687-4f45-9708-019B960494DF}">
-              <a14:hiddenLine xmlns="" xmlns:a14="http://schemas.microsoft.com/office/drawing/2010/main" w="9525">
+              <a14:hiddenLine xmlns:a14="http://schemas.microsoft.com/office/drawing/2010/main" xmlns="" w="9525">
                 <a:solidFill>
                   <a:srgbClr val="000000"/>
                 </a:solidFill>
@@ -1097,14 +1097,14 @@
           <a:ln/>
           <a:extLst>
             <a:ext uri="{909E8E84-426E-40dd-AFC4-6F175D3DCCD1}">
-              <a14:hiddenFill xmlns="" xmlns:a14="http://schemas.microsoft.com/office/drawing/2010/main">
+              <a14:hiddenFill xmlns:a14="http://schemas.microsoft.com/office/drawing/2010/main" xmlns="">
                 <a:solidFill>
                   <a:srgbClr val="FFFFFF"/>
                 </a:solidFill>
               </a14:hiddenFill>
             </a:ext>
             <a:ext uri="{91240B29-F687-4f45-9708-019B960494DF}">
-              <a14:hiddenLine xmlns="" xmlns:a14="http://schemas.microsoft.com/office/drawing/2010/main" w="9525">
+              <a14:hiddenLine xmlns:a14="http://schemas.microsoft.com/office/drawing/2010/main" xmlns="" w="9525">
                 <a:solidFill>
                   <a:srgbClr val="000000"/>
                 </a:solidFill>
@@ -1305,7 +1305,7 @@
           </a:ln>
           <a:extLst>
             <a:ext uri="{91240B29-F687-4f45-9708-019B960494DF}">
-              <a14:hiddenLine xmlns="" xmlns:a14="http://schemas.microsoft.com/office/drawing/2010/main" w="9525">
+              <a14:hiddenLine xmlns:a14="http://schemas.microsoft.com/office/drawing/2010/main" xmlns="" w="9525">
                 <a:solidFill>
                   <a:srgbClr val="000000"/>
                 </a:solidFill>
@@ -1471,14 +1471,14 @@
           </a:ln>
           <a:extLst>
             <a:ext uri="{909E8E84-426E-40dd-AFC4-6F175D3DCCD1}">
-              <a14:hiddenFill xmlns="" xmlns:a14="http://schemas.microsoft.com/office/drawing/2010/main">
+              <a14:hiddenFill xmlns:a14="http://schemas.microsoft.com/office/drawing/2010/main" xmlns="">
                 <a:solidFill>
                   <a:srgbClr val="FFFFFF"/>
                 </a:solidFill>
               </a14:hiddenFill>
             </a:ext>
             <a:ext uri="{91240B29-F687-4f45-9708-019B960494DF}">
-              <a14:hiddenLine xmlns="" xmlns:a14="http://schemas.microsoft.com/office/drawing/2010/main" w="9525">
+              <a14:hiddenLine xmlns:a14="http://schemas.microsoft.com/office/drawing/2010/main" xmlns="" w="9525">
                 <a:solidFill>
                   <a:srgbClr val="000000"/>
                 </a:solidFill>
@@ -3712,7 +3712,7 @@
             </a:ln>
             <a:extLst>
               <a:ext uri="{91240B29-F687-4f45-9708-019B960494DF}">
-                <a14:hiddenLine xmlns="" xmlns:a14="http://schemas.microsoft.com/office/drawing/2010/main" w="9525">
+                <a14:hiddenLine xmlns:a14="http://schemas.microsoft.com/office/drawing/2010/main" xmlns="" w="9525">
                   <a:solidFill>
                     <a:srgbClr val="000000"/>
                   </a:solidFill>
@@ -3875,7 +3875,7 @@
             </a:ln>
             <a:extLst>
               <a:ext uri="{91240B29-F687-4f45-9708-019B960494DF}">
-                <a14:hiddenLine xmlns="" xmlns:a14="http://schemas.microsoft.com/office/drawing/2010/main" w="9525">
+                <a14:hiddenLine xmlns:a14="http://schemas.microsoft.com/office/drawing/2010/main" xmlns="" w="9525">
                   <a:solidFill>
                     <a:srgbClr val="000000"/>
                   </a:solidFill>
@@ -4031,14 +4031,14 @@
           </a:ln>
           <a:extLst>
             <a:ext uri="{909E8E84-426E-40dd-AFC4-6F175D3DCCD1}">
-              <a14:hiddenFill xmlns="" xmlns:a14="http://schemas.microsoft.com/office/drawing/2010/main">
+              <a14:hiddenFill xmlns:a14="http://schemas.microsoft.com/office/drawing/2010/main" xmlns="">
                 <a:solidFill>
                   <a:srgbClr val="FFFFFF"/>
                 </a:solidFill>
               </a14:hiddenFill>
             </a:ext>
             <a:ext uri="{91240B29-F687-4f45-9708-019B960494DF}">
-              <a14:hiddenLine xmlns="" xmlns:a14="http://schemas.microsoft.com/office/drawing/2010/main" w="9525">
+              <a14:hiddenLine xmlns:a14="http://schemas.microsoft.com/office/drawing/2010/main" xmlns="" w="9525">
                 <a:solidFill>
                   <a:srgbClr val="000000"/>
                 </a:solidFill>
@@ -4095,14 +4095,14 @@
           </a:ln>
           <a:extLst>
             <a:ext uri="{909E8E84-426E-40dd-AFC4-6F175D3DCCD1}">
-              <a14:hiddenFill xmlns="" xmlns:a14="http://schemas.microsoft.com/office/drawing/2010/main">
+              <a14:hiddenFill xmlns:a14="http://schemas.microsoft.com/office/drawing/2010/main" xmlns="">
                 <a:solidFill>
                   <a:srgbClr val="FFFFFF"/>
                 </a:solidFill>
               </a14:hiddenFill>
             </a:ext>
             <a:ext uri="{91240B29-F687-4f45-9708-019B960494DF}">
-              <a14:hiddenLine xmlns="" xmlns:a14="http://schemas.microsoft.com/office/drawing/2010/main" w="9525">
+              <a14:hiddenLine xmlns:a14="http://schemas.microsoft.com/office/drawing/2010/main" xmlns="" w="9525">
                 <a:solidFill>
                   <a:srgbClr val="000000"/>
                 </a:solidFill>
@@ -4198,14 +4198,14 @@
           </a:ln>
           <a:extLst>
             <a:ext uri="{909E8E84-426E-40dd-AFC4-6F175D3DCCD1}">
-              <a14:hiddenFill xmlns="" xmlns:a14="http://schemas.microsoft.com/office/drawing/2010/main">
+              <a14:hiddenFill xmlns:a14="http://schemas.microsoft.com/office/drawing/2010/main" xmlns="">
                 <a:solidFill>
                   <a:srgbClr val="FFFFFF"/>
                 </a:solidFill>
               </a14:hiddenFill>
             </a:ext>
             <a:ext uri="{91240B29-F687-4f45-9708-019B960494DF}">
-              <a14:hiddenLine xmlns="" xmlns:a14="http://schemas.microsoft.com/office/drawing/2010/main" w="9525">
+              <a14:hiddenLine xmlns:a14="http://schemas.microsoft.com/office/drawing/2010/main" xmlns="" w="9525">
                 <a:solidFill>
                   <a:srgbClr val="000000"/>
                 </a:solidFill>
@@ -4777,14 +4777,14 @@
           </a:ln>
           <a:extLst>
             <a:ext uri="{909E8E84-426E-40dd-AFC4-6F175D3DCCD1}">
-              <a14:hiddenFill xmlns="" xmlns:a14="http://schemas.microsoft.com/office/drawing/2010/main">
+              <a14:hiddenFill xmlns:a14="http://schemas.microsoft.com/office/drawing/2010/main" xmlns="">
                 <a:solidFill>
                   <a:srgbClr val="FFFFFF"/>
                 </a:solidFill>
               </a14:hiddenFill>
             </a:ext>
             <a:ext uri="{91240B29-F687-4f45-9708-019B960494DF}">
-              <a14:hiddenLine xmlns="" xmlns:a14="http://schemas.microsoft.com/office/drawing/2010/main" w="9525">
+              <a14:hiddenLine xmlns:a14="http://schemas.microsoft.com/office/drawing/2010/main" xmlns="" w="9525">
                 <a:solidFill>
                   <a:srgbClr val="000000"/>
                 </a:solidFill>
@@ -4907,14 +4907,14 @@
           </a:ln>
           <a:extLst>
             <a:ext uri="{909E8E84-426E-40dd-AFC4-6F175D3DCCD1}">
-              <a14:hiddenFill xmlns="" xmlns:a14="http://schemas.microsoft.com/office/drawing/2010/main">
+              <a14:hiddenFill xmlns:a14="http://schemas.microsoft.com/office/drawing/2010/main" xmlns="">
                 <a:solidFill>
                   <a:srgbClr val="FFFFFF"/>
                 </a:solidFill>
               </a14:hiddenFill>
             </a:ext>
             <a:ext uri="{91240B29-F687-4f45-9708-019B960494DF}">
-              <a14:hiddenLine xmlns="" xmlns:a14="http://schemas.microsoft.com/office/drawing/2010/main" w="9525">
+              <a14:hiddenLine xmlns:a14="http://schemas.microsoft.com/office/drawing/2010/main" xmlns="" w="9525">
                 <a:solidFill>
                   <a:srgbClr val="000000"/>
                 </a:solidFill>
@@ -6159,7 +6159,7 @@
               <a:rPr lang="en-US" sz="2000" dirty="0">
                 <a:hlinkClick r:id="rId2"/>
               </a:rPr>
-              <a:t>https://wonsunahn.github.io/Capstone_Spring2024/final_paper</a:t>
+              <a:t>https://wonsunahn.github.io/Capstone_Fall2024/final_paper</a:t>
             </a:r>
             <a:endParaRPr lang="en-US" sz="2000" dirty="0"/>
           </a:p>
@@ -6879,7 +6879,7 @@
           <a:p>
             <a:r>
               <a:rPr lang="en-US" altLang="en-US" dirty="0"/>
-              <a:t>~2 talks per day. 50 / 2 = 25 minutes per talk.</a:t>
+              <a:t>~5 talks per day. 50 / 2 = 10 minutes per talk.</a:t>
             </a:r>
           </a:p>
           <a:p>
@@ -6888,7 +6888,7 @@
           <a:p>
             <a:r>
               <a:rPr lang="en-US" altLang="en-US" dirty="0"/>
-              <a:t>10-15 minutes: Presentation talk</a:t>
+              <a:t>5 minutes: Presentation talk</a:t>
             </a:r>
           </a:p>
           <a:p>
@@ -6906,13 +6906,28 @@
             </a:r>
           </a:p>
           <a:p>
+            <a:r>
+              <a:rPr lang="en-US" altLang="en-US" dirty="0"/>
+              <a:t>3 minutes: Q &amp; A</a:t>
+            </a:r>
+          </a:p>
+          <a:p>
+            <a:r>
+              <a:rPr lang="en-US" altLang="en-US" dirty="0"/>
+              <a:t>2 minutes: Intermission</a:t>
+            </a:r>
+          </a:p>
+          <a:p>
+            <a:pPr lvl="1"/>
+            <a:r>
+              <a:rPr lang="en-US" altLang="en-US" dirty="0"/>
+              <a:t>Switch speakers, audience completes </a:t>
+            </a:r>
+            <a:r>
+              <a:rPr lang="en-US" altLang="en-US"/>
+              <a:t>peer feedback</a:t>
+            </a:r>
             <a:endParaRPr lang="en-US" altLang="en-US" dirty="0"/>
-          </a:p>
-          <a:p>
-            <a:r>
-              <a:rPr lang="en-US" altLang="en-US" dirty="0"/>
-              <a:t>10 minutes: Q &amp; A</a:t>
-            </a:r>
           </a:p>
           <a:p>
             <a:endParaRPr lang="en-US" altLang="en-US" dirty="0">
@@ -7119,7 +7134,7 @@
                                         <p:tgtEl>
                                           <p:spTgt spid="3">
                                             <p:txEl>
-                                              <p:pRg st="5" end="5"/>
+                                              <p:pRg st="4" end="4"/>
                                             </p:txEl>
                                           </p:spTgt>
                                         </p:tgtEl>
@@ -7168,7 +7183,7 @@
                                         <p:tgtEl>
                                           <p:spTgt spid="3">
                                             <p:txEl>
-                                              <p:pRg st="7" end="7"/>
+                                              <p:pRg st="5" end="5"/>
                                             </p:txEl>
                                           </p:spTgt>
                                         </p:tgtEl>
@@ -7199,7 +7214,87 @@
                                         <p:tgtEl>
                                           <p:spTgt spid="3">
                                             <p:txEl>
+                                              <p:pRg st="6" end="6"/>
+                                            </p:txEl>
+                                          </p:spTgt>
+                                        </p:tgtEl>
+                                        <p:attrNameLst>
+                                          <p:attrName>style.visibility</p:attrName>
+                                        </p:attrNameLst>
+                                      </p:cBhvr>
+                                      <p:to>
+                                        <p:strVal val="visible"/>
+                                      </p:to>
+                                    </p:set>
+                                  </p:childTnLst>
+                                </p:cTn>
+                              </p:par>
+                            </p:childTnLst>
+                          </p:cTn>
+                        </p:par>
+                      </p:childTnLst>
+                    </p:cTn>
+                  </p:par>
+                  <p:par>
+                    <p:cTn id="23" fill="hold">
+                      <p:stCondLst>
+                        <p:cond delay="indefinite"/>
+                      </p:stCondLst>
+                      <p:childTnLst>
+                        <p:par>
+                          <p:cTn id="24" fill="hold">
+                            <p:stCondLst>
+                              <p:cond delay="0"/>
+                            </p:stCondLst>
+                            <p:childTnLst>
+                              <p:par>
+                                <p:cTn id="25" presetID="1" presetClass="entr" presetSubtype="0" fill="hold" grpId="0" nodeType="clickEffect">
+                                  <p:stCondLst>
+                                    <p:cond delay="0"/>
+                                  </p:stCondLst>
+                                  <p:childTnLst>
+                                    <p:set>
+                                      <p:cBhvr>
+                                        <p:cTn id="26" dur="1" fill="hold">
+                                          <p:stCondLst>
+                                            <p:cond delay="0"/>
+                                          </p:stCondLst>
+                                        </p:cTn>
+                                        <p:tgtEl>
+                                          <p:spTgt spid="3">
+                                            <p:txEl>
                                               <p:pRg st="8" end="8"/>
+                                            </p:txEl>
+                                          </p:spTgt>
+                                        </p:tgtEl>
+                                        <p:attrNameLst>
+                                          <p:attrName>style.visibility</p:attrName>
+                                        </p:attrNameLst>
+                                      </p:cBhvr>
+                                      <p:to>
+                                        <p:strVal val="visible"/>
+                                      </p:to>
+                                    </p:set>
+                                  </p:childTnLst>
+                                </p:cTn>
+                              </p:par>
+                              <p:par>
+                                <p:cTn id="27" presetID="1" presetClass="entr" presetSubtype="0" fill="hold" grpId="0" nodeType="withEffect">
+                                  <p:stCondLst>
+                                    <p:cond delay="0"/>
+                                  </p:stCondLst>
+                                  <p:childTnLst>
+                                    <p:set>
+                                      <p:cBhvr>
+                                        <p:cTn id="28" dur="1" fill="hold">
+                                          <p:stCondLst>
+                                            <p:cond delay="0"/>
+                                          </p:stCondLst>
+                                        </p:cTn>
+                                        <p:tgtEl>
+                                          <p:spTgt spid="3">
+                                            <p:txEl>
+                                              <p:pRg st="9" end="9"/>
                                             </p:txEl>
                                           </p:spTgt>
                                         </p:tgtEl>

</xml_diff>